<commit_message>
Add button image to data conversion slide.
</commit_message>
<xml_diff>
--- a/Presentation/evoShapeRecognizer/Session02/SingleNeuron.pptx
+++ b/Presentation/evoShapeRecognizer/Session02/SingleNeuron.pptx
@@ -200,7 +200,7 @@
           <a:p>
             <a:fld id="{C1CC4E72-FCB9-49A2-A583-58870FF14BEC}" type="datetimeFigureOut">
               <a:rPr lang="en-US" smtClean="0"/>
-              <a:t>4/8/2022</a:t>
+              <a:t>4/14/2022</a:t>
             </a:fld>
             <a:endParaRPr lang="en-US"/>
           </a:p>
@@ -2986,7 +2986,7 @@
           <a:p>
             <a:fld id="{DBC0DE96-5599-4BE0-A2F8-875B97B0D60C}" type="datetimeFigureOut">
               <a:rPr lang="en-US" smtClean="0"/>
-              <a:t>4/8/2022</a:t>
+              <a:t>4/14/2022</a:t>
             </a:fld>
             <a:endParaRPr lang="en-US"/>
           </a:p>
@@ -3156,7 +3156,7 @@
           <a:p>
             <a:fld id="{DBC0DE96-5599-4BE0-A2F8-875B97B0D60C}" type="datetimeFigureOut">
               <a:rPr lang="en-US" smtClean="0"/>
-              <a:t>4/8/2022</a:t>
+              <a:t>4/14/2022</a:t>
             </a:fld>
             <a:endParaRPr lang="en-US"/>
           </a:p>
@@ -3336,7 +3336,7 @@
           <a:p>
             <a:fld id="{DBC0DE96-5599-4BE0-A2F8-875B97B0D60C}" type="datetimeFigureOut">
               <a:rPr lang="en-US" smtClean="0"/>
-              <a:t>4/8/2022</a:t>
+              <a:t>4/14/2022</a:t>
             </a:fld>
             <a:endParaRPr lang="en-US"/>
           </a:p>
@@ -3506,7 +3506,7 @@
           <a:p>
             <a:fld id="{DBC0DE96-5599-4BE0-A2F8-875B97B0D60C}" type="datetimeFigureOut">
               <a:rPr lang="en-US" smtClean="0"/>
-              <a:t>4/8/2022</a:t>
+              <a:t>4/14/2022</a:t>
             </a:fld>
             <a:endParaRPr lang="en-US"/>
           </a:p>
@@ -3752,7 +3752,7 @@
           <a:p>
             <a:fld id="{DBC0DE96-5599-4BE0-A2F8-875B97B0D60C}" type="datetimeFigureOut">
               <a:rPr lang="en-US" smtClean="0"/>
-              <a:t>4/8/2022</a:t>
+              <a:t>4/14/2022</a:t>
             </a:fld>
             <a:endParaRPr lang="en-US"/>
           </a:p>
@@ -3984,7 +3984,7 @@
           <a:p>
             <a:fld id="{DBC0DE96-5599-4BE0-A2F8-875B97B0D60C}" type="datetimeFigureOut">
               <a:rPr lang="en-US" smtClean="0"/>
-              <a:t>4/8/2022</a:t>
+              <a:t>4/14/2022</a:t>
             </a:fld>
             <a:endParaRPr lang="en-US"/>
           </a:p>
@@ -4351,7 +4351,7 @@
           <a:p>
             <a:fld id="{DBC0DE96-5599-4BE0-A2F8-875B97B0D60C}" type="datetimeFigureOut">
               <a:rPr lang="en-US" smtClean="0"/>
-              <a:t>4/8/2022</a:t>
+              <a:t>4/14/2022</a:t>
             </a:fld>
             <a:endParaRPr lang="en-US"/>
           </a:p>
@@ -4469,7 +4469,7 @@
           <a:p>
             <a:fld id="{DBC0DE96-5599-4BE0-A2F8-875B97B0D60C}" type="datetimeFigureOut">
               <a:rPr lang="en-US" smtClean="0"/>
-              <a:t>4/8/2022</a:t>
+              <a:t>4/14/2022</a:t>
             </a:fld>
             <a:endParaRPr lang="en-US"/>
           </a:p>
@@ -4564,7 +4564,7 @@
           <a:p>
             <a:fld id="{DBC0DE96-5599-4BE0-A2F8-875B97B0D60C}" type="datetimeFigureOut">
               <a:rPr lang="en-US" smtClean="0"/>
-              <a:t>4/8/2022</a:t>
+              <a:t>4/14/2022</a:t>
             </a:fld>
             <a:endParaRPr lang="en-US"/>
           </a:p>
@@ -4841,7 +4841,7 @@
           <a:p>
             <a:fld id="{DBC0DE96-5599-4BE0-A2F8-875B97B0D60C}" type="datetimeFigureOut">
               <a:rPr lang="en-US" smtClean="0"/>
-              <a:t>4/8/2022</a:t>
+              <a:t>4/14/2022</a:t>
             </a:fld>
             <a:endParaRPr lang="en-US"/>
           </a:p>
@@ -5098,7 +5098,7 @@
           <a:p>
             <a:fld id="{DBC0DE96-5599-4BE0-A2F8-875B97B0D60C}" type="datetimeFigureOut">
               <a:rPr lang="en-US" smtClean="0"/>
-              <a:t>4/8/2022</a:t>
+              <a:t>4/14/2022</a:t>
             </a:fld>
             <a:endParaRPr lang="en-US"/>
           </a:p>
@@ -5311,7 +5311,7 @@
           <a:p>
             <a:fld id="{DBC0DE96-5599-4BE0-A2F8-875B97B0D60C}" type="datetimeFigureOut">
               <a:rPr lang="en-US" smtClean="0"/>
-              <a:t>4/8/2022</a:t>
+              <a:t>4/14/2022</a:t>
             </a:fld>
             <a:endParaRPr lang="en-US"/>
           </a:p>
@@ -9490,6 +9490,62 @@
                 </a:outerShdw>
               </a:effectLst>
             </a:endParaRPr>
+          </a:p>
+        </p:txBody>
+      </p:sp>
+      <p:sp>
+        <p:nvSpPr>
+          <p:cNvPr id="2" name="Rectangle 1">
+            <a:extLst>
+              <a:ext uri="{FF2B5EF4-FFF2-40B4-BE49-F238E27FC236}">
+                <a16:creationId xmlns:a16="http://schemas.microsoft.com/office/drawing/2014/main" id="{E0DAA439-EA7C-42BC-A428-7CE8A4A7C209}"/>
+              </a:ext>
+            </a:extLst>
+          </p:cNvPr>
+          <p:cNvSpPr/>
+          <p:nvPr/>
+        </p:nvSpPr>
+        <p:spPr>
+          <a:xfrm>
+            <a:off x="6096000" y="4258937"/>
+            <a:ext cx="953037" cy="621673"/>
+          </a:xfrm>
+          <a:prstGeom prst="rect">
+            <a:avLst/>
+          </a:prstGeom>
+          <a:noFill/>
+          <a:ln>
+            <a:solidFill>
+              <a:schemeClr val="tx1"/>
+            </a:solidFill>
+          </a:ln>
+        </p:spPr>
+        <p:style>
+          <a:lnRef idx="2">
+            <a:schemeClr val="accent1">
+              <a:shade val="50000"/>
+            </a:schemeClr>
+          </a:lnRef>
+          <a:fillRef idx="1">
+            <a:schemeClr val="accent1"/>
+          </a:fillRef>
+          <a:effectRef idx="0">
+            <a:schemeClr val="accent1"/>
+          </a:effectRef>
+          <a:fontRef idx="minor">
+            <a:schemeClr val="lt1"/>
+          </a:fontRef>
+        </p:style>
+        <p:txBody>
+          <a:bodyPr rtlCol="0" anchor="ctr"/>
+          <a:lstStyle/>
+          <a:p>
+            <a:pPr algn="ctr"/>
+            <a:r>
+              <a:rPr lang="hu-HU" dirty="0"/>
+              <a:t>Button</a:t>
+            </a:r>
+            <a:endParaRPr lang="en-US" dirty="0"/>
           </a:p>
         </p:txBody>
       </p:sp>

</xml_diff>